<commit_message>
Dodan webApp k uvodu in backendu.
</commit_message>
<xml_diff>
--- a/APLIGS-predstavitev.pptx
+++ b/APLIGS-predstavitev.pptx
@@ -11,7 +11,8 @@
     <p:sldId id="260" r:id="rId5"/>
     <p:sldId id="259" r:id="rId6"/>
     <p:sldId id="261" r:id="rId7"/>
-    <p:sldId id="262" r:id="rId8"/>
+    <p:sldId id="263" r:id="rId8"/>
+    <p:sldId id="262" r:id="rId9"/>
   </p:sldIdLst>
   <p:sldSz cx="12192000" cy="6858000"/>
   <p:notesSz cx="6858000" cy="9144000"/>
@@ -110,6 +111,11 @@
       </a:defRPr>
     </a:lvl9pPr>
   </p:defaultTextStyle>
+  <p:extLst>
+    <p:ext uri="{EFAFB233-063F-42B5-8137-9DF3F51BA10A}">
+      <p15:sldGuideLst xmlns:p15="http://schemas.microsoft.com/office/powerpoint/2012/main"/>
+    </p:ext>
+  </p:extLst>
 </p:presentation>
 </file>
 
@@ -276,7 +282,7 @@
           <a:p>
             <a:fld id="{ECB5D2EC-F17A-4DBE-A087-CB9DD69ED8C5}" type="datetimeFigureOut">
               <a:rPr lang="sl-SI" smtClean="0"/>
-              <a:t>13. 01. 2017</a:t>
+              <a:t>15. 01. 2017</a:t>
             </a:fld>
             <a:endParaRPr lang="sl-SI"/>
           </a:p>
@@ -446,7 +452,7 @@
           <a:p>
             <a:fld id="{ECB5D2EC-F17A-4DBE-A087-CB9DD69ED8C5}" type="datetimeFigureOut">
               <a:rPr lang="sl-SI" smtClean="0"/>
-              <a:t>13. 01. 2017</a:t>
+              <a:t>15. 01. 2017</a:t>
             </a:fld>
             <a:endParaRPr lang="sl-SI"/>
           </a:p>
@@ -626,7 +632,7 @@
           <a:p>
             <a:fld id="{ECB5D2EC-F17A-4DBE-A087-CB9DD69ED8C5}" type="datetimeFigureOut">
               <a:rPr lang="sl-SI" smtClean="0"/>
-              <a:t>13. 01. 2017</a:t>
+              <a:t>15. 01. 2017</a:t>
             </a:fld>
             <a:endParaRPr lang="sl-SI"/>
           </a:p>
@@ -796,7 +802,7 @@
           <a:p>
             <a:fld id="{ECB5D2EC-F17A-4DBE-A087-CB9DD69ED8C5}" type="datetimeFigureOut">
               <a:rPr lang="sl-SI" smtClean="0"/>
-              <a:t>13. 01. 2017</a:t>
+              <a:t>15. 01. 2017</a:t>
             </a:fld>
             <a:endParaRPr lang="sl-SI"/>
           </a:p>
@@ -1064,7 +1070,7 @@
           <a:p>
             <a:fld id="{ECB5D2EC-F17A-4DBE-A087-CB9DD69ED8C5}" type="datetimeFigureOut">
               <a:rPr lang="sl-SI" smtClean="0"/>
-              <a:t>13. 01. 2017</a:t>
+              <a:t>15. 01. 2017</a:t>
             </a:fld>
             <a:endParaRPr lang="sl-SI"/>
           </a:p>
@@ -1296,7 +1302,7 @@
           <a:p>
             <a:fld id="{ECB5D2EC-F17A-4DBE-A087-CB9DD69ED8C5}" type="datetimeFigureOut">
               <a:rPr lang="sl-SI" smtClean="0"/>
-              <a:t>13. 01. 2017</a:t>
+              <a:t>15. 01. 2017</a:t>
             </a:fld>
             <a:endParaRPr lang="sl-SI"/>
           </a:p>
@@ -1655,7 +1661,7 @@
           <a:p>
             <a:fld id="{ECB5D2EC-F17A-4DBE-A087-CB9DD69ED8C5}" type="datetimeFigureOut">
               <a:rPr lang="sl-SI" smtClean="0"/>
-              <a:t>13. 01. 2017</a:t>
+              <a:t>15. 01. 2017</a:t>
             </a:fld>
             <a:endParaRPr lang="sl-SI"/>
           </a:p>
@@ -1796,7 +1802,7 @@
           <a:p>
             <a:fld id="{ECB5D2EC-F17A-4DBE-A087-CB9DD69ED8C5}" type="datetimeFigureOut">
               <a:rPr lang="sl-SI" smtClean="0"/>
-              <a:t>13. 01. 2017</a:t>
+              <a:t>15. 01. 2017</a:t>
             </a:fld>
             <a:endParaRPr lang="sl-SI"/>
           </a:p>
@@ -1891,7 +1897,7 @@
           <a:p>
             <a:fld id="{ECB5D2EC-F17A-4DBE-A087-CB9DD69ED8C5}" type="datetimeFigureOut">
               <a:rPr lang="sl-SI" smtClean="0"/>
-              <a:t>13. 01. 2017</a:t>
+              <a:t>15. 01. 2017</a:t>
             </a:fld>
             <a:endParaRPr lang="sl-SI"/>
           </a:p>
@@ -2248,7 +2254,7 @@
           <a:p>
             <a:fld id="{ECB5D2EC-F17A-4DBE-A087-CB9DD69ED8C5}" type="datetimeFigureOut">
               <a:rPr lang="sl-SI" smtClean="0"/>
-              <a:t>13. 01. 2017</a:t>
+              <a:t>15. 01. 2017</a:t>
             </a:fld>
             <a:endParaRPr lang="sl-SI"/>
           </a:p>
@@ -2605,7 +2611,7 @@
           <a:p>
             <a:fld id="{ECB5D2EC-F17A-4DBE-A087-CB9DD69ED8C5}" type="datetimeFigureOut">
               <a:rPr lang="sl-SI" smtClean="0"/>
-              <a:t>13. 01. 2017</a:t>
+              <a:t>15. 01. 2017</a:t>
             </a:fld>
             <a:endParaRPr lang="sl-SI"/>
           </a:p>
@@ -2846,7 +2852,7 @@
           <a:p>
             <a:fld id="{ECB5D2EC-F17A-4DBE-A087-CB9DD69ED8C5}" type="datetimeFigureOut">
               <a:rPr lang="sl-SI" smtClean="0"/>
-              <a:t>13. 01. 2017</a:t>
+              <a:t>15. 01. 2017</a:t>
             </a:fld>
             <a:endParaRPr lang="sl-SI"/>
           </a:p>
@@ -3421,6 +3427,13 @@
   <p:clrMapOvr>
     <a:masterClrMapping/>
   </p:clrMapOvr>
+  <p:timing>
+    <p:tnLst>
+      <p:par>
+        <p:cTn id="1" dur="indefinite" restart="never" nodeType="tmRoot"/>
+      </p:par>
+    </p:tnLst>
+  </p:timing>
 </p:sld>
 </file>
 
@@ -3497,6 +3510,13 @@
   <p:clrMapOvr>
     <a:masterClrMapping/>
   </p:clrMapOvr>
+  <p:timing>
+    <p:tnLst>
+      <p:par>
+        <p:cTn id="1" dur="indefinite" restart="never" nodeType="tmRoot"/>
+      </p:par>
+    </p:tnLst>
+  </p:timing>
 </p:sld>
 </file>
 
@@ -3624,6 +3644,13 @@
   <p:clrMapOvr>
     <a:masterClrMapping/>
   </p:clrMapOvr>
+  <p:timing>
+    <p:tnLst>
+      <p:par>
+        <p:cTn id="1" dur="indefinite" restart="never" nodeType="tmRoot"/>
+      </p:par>
+    </p:tnLst>
+  </p:timing>
 </p:sld>
 </file>
 
@@ -3710,6 +3737,13 @@
   <p:clrMapOvr>
     <a:masterClrMapping/>
   </p:clrMapOvr>
+  <p:timing>
+    <p:tnLst>
+      <p:par>
+        <p:cTn id="1" dur="indefinite" restart="never" nodeType="tmRoot"/>
+      </p:par>
+    </p:tnLst>
+  </p:timing>
 </p:sld>
 </file>
 
@@ -3889,6 +3923,13 @@
   <p:clrMapOvr>
     <a:masterClrMapping/>
   </p:clrMapOvr>
+  <p:timing>
+    <p:tnLst>
+      <p:par>
+        <p:cTn id="1" dur="indefinite" restart="never" nodeType="tmRoot"/>
+      </p:par>
+    </p:tnLst>
+  </p:timing>
 </p:sld>
 </file>
 
@@ -3926,8 +3967,13 @@
           <a:p>
             <a:r>
               <a:rPr lang="sl-SI" dirty="0"/>
-              <a:t>Spletna aplikacija</a:t>
-            </a:r>
+              <a:t>Spletna </a:t>
+            </a:r>
+            <a:r>
+              <a:rPr lang="sl-SI" dirty="0" smtClean="0"/>
+              <a:t>aplikacija - Funkcionalnosti</a:t>
+            </a:r>
+            <a:endParaRPr lang="sl-SI" dirty="0"/>
           </a:p>
         </p:txBody>
       </p:sp>
@@ -3946,7 +3992,47 @@
           <a:bodyPr/>
           <a:lstStyle/>
           <a:p>
-            <a:endParaRPr lang="sl-SI"/>
+            <a:r>
+              <a:rPr lang="sl-SI" dirty="0" smtClean="0"/>
+              <a:t>Prijava in registracija</a:t>
+            </a:r>
+          </a:p>
+          <a:p>
+            <a:r>
+              <a:rPr lang="sl-SI" dirty="0" smtClean="0"/>
+              <a:t>Pregled najnovejših oglasov (Skupina išče/glasbenik išče)</a:t>
+            </a:r>
+          </a:p>
+          <a:p>
+            <a:r>
+              <a:rPr lang="sl-SI" dirty="0" smtClean="0"/>
+              <a:t>Filtriranje oglasov</a:t>
+            </a:r>
+          </a:p>
+          <a:p>
+            <a:r>
+              <a:rPr lang="sl-SI" dirty="0" smtClean="0"/>
+              <a:t>Oddaja, urejanje in brisanje svojih oglasov</a:t>
+            </a:r>
+          </a:p>
+          <a:p>
+            <a:r>
+              <a:rPr lang="sl-SI" dirty="0" smtClean="0"/>
+              <a:t>Iskanje uporabnikov</a:t>
+            </a:r>
+          </a:p>
+          <a:p>
+            <a:r>
+              <a:rPr lang="sl-SI" dirty="0" smtClean="0"/>
+              <a:t>Pošiljanje sporočil</a:t>
+            </a:r>
+          </a:p>
+          <a:p>
+            <a:r>
+              <a:rPr lang="sl-SI" dirty="0" smtClean="0"/>
+              <a:t>Urejanje in brisanje računa</a:t>
+            </a:r>
+            <a:endParaRPr lang="sl-SI" dirty="0"/>
           </a:p>
         </p:txBody>
       </p:sp>
@@ -3960,6 +4046,13 @@
   <p:clrMapOvr>
     <a:masterClrMapping/>
   </p:clrMapOvr>
+  <p:timing>
+    <p:tnLst>
+      <p:par>
+        <p:cTn id="1" dur="indefinite" restart="never" nodeType="tmRoot"/>
+      </p:par>
+    </p:tnLst>
+  </p:timing>
 </p:sld>
 </file>
 
@@ -3997,8 +4090,161 @@
           <a:p>
             <a:r>
               <a:rPr lang="sl-SI" dirty="0"/>
-              <a:t>Android aplikacija</a:t>
-            </a:r>
+              <a:t>Spletna </a:t>
+            </a:r>
+            <a:r>
+              <a:rPr lang="sl-SI" dirty="0" smtClean="0"/>
+              <a:t>aplikacija - Tehnologije</a:t>
+            </a:r>
+            <a:endParaRPr lang="sl-SI" dirty="0"/>
+          </a:p>
+        </p:txBody>
+      </p:sp>
+      <p:pic>
+        <p:nvPicPr>
+          <p:cNvPr id="1026" name="Picture 2" descr="https://academy.zenva.com/wp-content/uploads/2014/08/Bootstrap-3.jpg"/>
+          <p:cNvPicPr>
+            <a:picLocks noGrp="1" noChangeAspect="1" noChangeArrowheads="1"/>
+          </p:cNvPicPr>
+          <p:nvPr>
+            <p:ph idx="1"/>
+          </p:nvPr>
+        </p:nvPicPr>
+        <p:blipFill>
+          <a:blip r:embed="rId2">
+            <a:extLst>
+              <a:ext uri="{28A0092B-C50C-407E-A947-70E740481C1C}">
+                <a14:useLocalDpi xmlns:a14="http://schemas.microsoft.com/office/drawing/2010/main" val="0"/>
+              </a:ext>
+            </a:extLst>
+          </a:blip>
+          <a:srcRect/>
+          <a:stretch>
+            <a:fillRect/>
+          </a:stretch>
+        </p:blipFill>
+        <p:spPr bwMode="auto">
+          <a:xfrm>
+            <a:off x="1255223" y="3176009"/>
+            <a:ext cx="4003963" cy="2252229"/>
+          </a:xfrm>
+          <a:prstGeom prst="rect">
+            <a:avLst/>
+          </a:prstGeom>
+          <a:noFill/>
+          <a:extLst>
+            <a:ext uri="{909E8E84-426E-40DD-AFC4-6F175D3DCCD1}">
+              <a14:hiddenFill xmlns:a14="http://schemas.microsoft.com/office/drawing/2010/main">
+                <a:solidFill>
+                  <a:srgbClr val="FFFFFF"/>
+                </a:solidFill>
+              </a14:hiddenFill>
+            </a:ext>
+          </a:extLst>
+        </p:spPr>
+      </p:pic>
+      <p:pic>
+        <p:nvPicPr>
+          <p:cNvPr id="1030" name="Picture 6" descr="https://www.onlinebuff.com/artimages/ajax2.jpg"/>
+          <p:cNvPicPr>
+            <a:picLocks noChangeAspect="1" noChangeArrowheads="1"/>
+          </p:cNvPicPr>
+          <p:nvPr/>
+        </p:nvPicPr>
+        <p:blipFill>
+          <a:blip r:embed="rId3">
+            <a:extLst>
+              <a:ext uri="{28A0092B-C50C-407E-A947-70E740481C1C}">
+                <a14:useLocalDpi xmlns:a14="http://schemas.microsoft.com/office/drawing/2010/main" val="0"/>
+              </a:ext>
+            </a:extLst>
+          </a:blip>
+          <a:srcRect/>
+          <a:stretch>
+            <a:fillRect/>
+          </a:stretch>
+        </p:blipFill>
+        <p:spPr bwMode="auto">
+          <a:xfrm>
+            <a:off x="6299200" y="2570480"/>
+            <a:ext cx="4543425" cy="3810000"/>
+          </a:xfrm>
+          <a:prstGeom prst="rect">
+            <a:avLst/>
+          </a:prstGeom>
+          <a:noFill/>
+          <a:extLst>
+            <a:ext uri="{909E8E84-426E-40DD-AFC4-6F175D3DCCD1}">
+              <a14:hiddenFill xmlns:a14="http://schemas.microsoft.com/office/drawing/2010/main">
+                <a:solidFill>
+                  <a:srgbClr val="FFFFFF"/>
+                </a:solidFill>
+              </a14:hiddenFill>
+            </a:ext>
+          </a:extLst>
+        </p:spPr>
+      </p:pic>
+    </p:spTree>
+    <p:extLst>
+      <p:ext uri="{BB962C8B-B14F-4D97-AF65-F5344CB8AC3E}">
+        <p14:creationId xmlns:p14="http://schemas.microsoft.com/office/powerpoint/2010/main" val="581030720"/>
+      </p:ext>
+    </p:extLst>
+  </p:cSld>
+  <p:clrMapOvr>
+    <a:masterClrMapping/>
+  </p:clrMapOvr>
+  <p:timing>
+    <p:tnLst>
+      <p:par>
+        <p:cTn id="1" dur="indefinite" restart="never" nodeType="tmRoot"/>
+      </p:par>
+    </p:tnLst>
+  </p:timing>
+</p:sld>
+</file>
+
+<file path=ppt/slides/slide8.xml><?xml version="1.0" encoding="utf-8"?>
+<p:sld xmlns:a="http://schemas.openxmlformats.org/drawingml/2006/main" xmlns:r="http://schemas.openxmlformats.org/officeDocument/2006/relationships" xmlns:p="http://schemas.openxmlformats.org/presentationml/2006/main">
+  <p:cSld>
+    <p:spTree>
+      <p:nvGrpSpPr>
+        <p:cNvPr id="1" name=""/>
+        <p:cNvGrpSpPr/>
+        <p:nvPr/>
+      </p:nvGrpSpPr>
+      <p:grpSpPr>
+        <a:xfrm>
+          <a:off x="0" y="0"/>
+          <a:ext cx="0" cy="0"/>
+          <a:chOff x="0" y="0"/>
+          <a:chExt cx="0" cy="0"/>
+        </a:xfrm>
+      </p:grpSpPr>
+      <p:sp>
+        <p:nvSpPr>
+          <p:cNvPr id="2" name="Naslov 1"/>
+          <p:cNvSpPr>
+            <a:spLocks noGrp="1"/>
+          </p:cNvSpPr>
+          <p:nvPr>
+            <p:ph type="title"/>
+          </p:nvPr>
+        </p:nvSpPr>
+        <p:spPr/>
+        <p:txBody>
+          <a:bodyPr/>
+          <a:lstStyle/>
+          <a:p>
+            <a:r>
+              <a:rPr lang="sl-SI" dirty="0"/>
+              <a:t>Android </a:t>
+            </a:r>
+            <a:r>
+              <a:rPr lang="sl-SI" dirty="0" smtClean="0"/>
+              <a:t>aplikacija</a:t>
+            </a:r>
+            <a:endParaRPr lang="sl-SI" dirty="0"/>
           </a:p>
         </p:txBody>
       </p:sp>
@@ -4031,6 +4277,13 @@
   <p:clrMapOvr>
     <a:masterClrMapping/>
   </p:clrMapOvr>
+  <p:timing>
+    <p:tnLst>
+      <p:par>
+        <p:cTn id="1" dur="indefinite" restart="never" nodeType="tmRoot"/>
+      </p:par>
+    </p:tnLst>
+  </p:timing>
 </p:sld>
 </file>
 

</xml_diff>